<commit_message>
complete doc of project
</commit_message>
<xml_diff>
--- a/Siavash Hasanpour-921042006.pptx
+++ b/Siavash Hasanpour-921042006.pptx
@@ -6467,6 +6467,36 @@
           </a:fontRef>
         </p:style>
       </p:cxnSp>
+      <p:sp>
+        <p:nvSpPr>
+          <p:cNvPr id="5" name="TextBox 4"/>
+          <p:cNvSpPr txBox="1"/>
+          <p:nvPr/>
+        </p:nvSpPr>
+        <p:spPr>
+          <a:xfrm>
+            <a:off x="677334" y="6246891"/>
+            <a:ext cx="671979" cy="369332"/>
+          </a:xfrm>
+          <a:prstGeom prst="rect">
+            <a:avLst/>
+          </a:prstGeom>
+          <a:noFill/>
+        </p:spPr>
+        <p:txBody>
+          <a:bodyPr wrap="none" rtlCol="0">
+            <a:spAutoFit/>
+          </a:bodyPr>
+          <a:lstStyle/>
+          <a:p>
+            <a:r>
+              <a:rPr lang="en-US" dirty="0" smtClean="0"/>
+              <a:t>7/25</a:t>
+            </a:r>
+            <a:endParaRPr lang="en-US" dirty="0"/>
+          </a:p>
+        </p:txBody>
+      </p:sp>
     </p:spTree>
     <p:extLst>
       <p:ext uri="{BB962C8B-B14F-4D97-AF65-F5344CB8AC3E}">
@@ -6558,6 +6588,36 @@
           </a:extLst>
         </p:spPr>
       </p:pic>
+      <p:sp>
+        <p:nvSpPr>
+          <p:cNvPr id="3" name="TextBox 2"/>
+          <p:cNvSpPr txBox="1"/>
+          <p:nvPr/>
+        </p:nvSpPr>
+        <p:spPr>
+          <a:xfrm>
+            <a:off x="677334" y="6246891"/>
+            <a:ext cx="671979" cy="369332"/>
+          </a:xfrm>
+          <a:prstGeom prst="rect">
+            <a:avLst/>
+          </a:prstGeom>
+          <a:noFill/>
+        </p:spPr>
+        <p:txBody>
+          <a:bodyPr wrap="none" rtlCol="0">
+            <a:spAutoFit/>
+          </a:bodyPr>
+          <a:lstStyle/>
+          <a:p>
+            <a:r>
+              <a:rPr lang="en-US" dirty="0" smtClean="0"/>
+              <a:t>8/25</a:t>
+            </a:r>
+            <a:endParaRPr lang="en-US" dirty="0"/>
+          </a:p>
+        </p:txBody>
+      </p:sp>
     </p:spTree>
     <p:extLst>
       <p:ext uri="{BB962C8B-B14F-4D97-AF65-F5344CB8AC3E}">
@@ -6647,6 +6707,36 @@
           </a:extLst>
         </p:spPr>
       </p:pic>
+      <p:sp>
+        <p:nvSpPr>
+          <p:cNvPr id="3" name="TextBox 2"/>
+          <p:cNvSpPr txBox="1"/>
+          <p:nvPr/>
+        </p:nvSpPr>
+        <p:spPr>
+          <a:xfrm>
+            <a:off x="677334" y="6246891"/>
+            <a:ext cx="671979" cy="369332"/>
+          </a:xfrm>
+          <a:prstGeom prst="rect">
+            <a:avLst/>
+          </a:prstGeom>
+          <a:noFill/>
+        </p:spPr>
+        <p:txBody>
+          <a:bodyPr wrap="none" rtlCol="0">
+            <a:spAutoFit/>
+          </a:bodyPr>
+          <a:lstStyle/>
+          <a:p>
+            <a:r>
+              <a:rPr lang="en-US" dirty="0" smtClean="0"/>
+              <a:t>9/25</a:t>
+            </a:r>
+            <a:endParaRPr lang="en-US" dirty="0"/>
+          </a:p>
+        </p:txBody>
+      </p:sp>
     </p:spTree>
     <p:extLst>
       <p:ext uri="{BB962C8B-B14F-4D97-AF65-F5344CB8AC3E}">
@@ -6868,6 +6958,36 @@
           </a:fontRef>
         </p:style>
       </p:cxnSp>
+      <p:sp>
+        <p:nvSpPr>
+          <p:cNvPr id="5" name="TextBox 4"/>
+          <p:cNvSpPr txBox="1"/>
+          <p:nvPr/>
+        </p:nvSpPr>
+        <p:spPr>
+          <a:xfrm>
+            <a:off x="677334" y="6246891"/>
+            <a:ext cx="793807" cy="369332"/>
+          </a:xfrm>
+          <a:prstGeom prst="rect">
+            <a:avLst/>
+          </a:prstGeom>
+          <a:noFill/>
+        </p:spPr>
+        <p:txBody>
+          <a:bodyPr wrap="none" rtlCol="0">
+            <a:spAutoFit/>
+          </a:bodyPr>
+          <a:lstStyle/>
+          <a:p>
+            <a:r>
+              <a:rPr lang="en-US" dirty="0" smtClean="0"/>
+              <a:t>10/25</a:t>
+            </a:r>
+            <a:endParaRPr lang="en-US" dirty="0"/>
+          </a:p>
+        </p:txBody>
+      </p:sp>
     </p:spTree>
     <p:extLst>
       <p:ext uri="{BB962C8B-B14F-4D97-AF65-F5344CB8AC3E}">
@@ -6927,13 +7047,7 @@
               <a:rPr lang="fa-IR" sz="4000" dirty="0" smtClean="0">
                 <a:cs typeface="B Nazanin" panose="00000400000000000000" pitchFamily="2" charset="-78"/>
               </a:rPr>
-              <a:t>بخش‌های </a:t>
-            </a:r>
-            <a:r>
-              <a:rPr lang="fa-IR" sz="4000" dirty="0" smtClean="0">
-                <a:cs typeface="B Nazanin" panose="00000400000000000000" pitchFamily="2" charset="-78"/>
-              </a:rPr>
-              <a:t>اصلی پروژه</a:t>
+              <a:t>بخش‌های اصلی پروژه</a:t>
             </a:r>
             <a:endParaRPr lang="en-US" sz="4000" dirty="0">
               <a:cs typeface="B Nazanin" panose="00000400000000000000" pitchFamily="2" charset="-78"/>
@@ -7048,6 +7162,36 @@
           </a:fontRef>
         </p:style>
       </p:cxnSp>
+      <p:sp>
+        <p:nvSpPr>
+          <p:cNvPr id="6" name="TextBox 5"/>
+          <p:cNvSpPr txBox="1"/>
+          <p:nvPr/>
+        </p:nvSpPr>
+        <p:spPr>
+          <a:xfrm>
+            <a:off x="677334" y="6246891"/>
+            <a:ext cx="793807" cy="369332"/>
+          </a:xfrm>
+          <a:prstGeom prst="rect">
+            <a:avLst/>
+          </a:prstGeom>
+          <a:noFill/>
+        </p:spPr>
+        <p:txBody>
+          <a:bodyPr wrap="none" rtlCol="0">
+            <a:spAutoFit/>
+          </a:bodyPr>
+          <a:lstStyle/>
+          <a:p>
+            <a:r>
+              <a:rPr lang="en-US" dirty="0" smtClean="0"/>
+              <a:t>11/25</a:t>
+            </a:r>
+            <a:endParaRPr lang="en-US" dirty="0"/>
+          </a:p>
+        </p:txBody>
+      </p:sp>
     </p:spTree>
     <p:extLst>
       <p:ext uri="{BB962C8B-B14F-4D97-AF65-F5344CB8AC3E}">
@@ -7146,13 +7290,7 @@
               <a:rPr lang="fa-IR" sz="2800" dirty="0" smtClean="0">
                 <a:cs typeface="B Nazanin" panose="00000400000000000000" pitchFamily="2" charset="-78"/>
               </a:rPr>
-              <a:t>به این صورت که هر پوشه که باز شد پوشه های موجود در آن را به صف اضافه </a:t>
-            </a:r>
-            <a:r>
-              <a:rPr lang="fa-IR" sz="2800" dirty="0" smtClean="0">
-                <a:cs typeface="B Nazanin" panose="00000400000000000000" pitchFamily="2" charset="-78"/>
-              </a:rPr>
-              <a:t>کرده</a:t>
+              <a:t>به این صورت که هر پوشه که باز شد پوشه های موجود در آن را به صف اضافه کرده</a:t>
             </a:r>
           </a:p>
           <a:p>
@@ -7181,13 +7319,7 @@
               <a:rPr lang="fa-IR" sz="2800" dirty="0" smtClean="0">
                 <a:cs typeface="B Nazanin" panose="00000400000000000000" pitchFamily="2" charset="-78"/>
               </a:rPr>
-              <a:t>و </a:t>
-            </a:r>
-            <a:r>
-              <a:rPr lang="fa-IR" sz="2800" dirty="0" smtClean="0">
-                <a:cs typeface="B Nazanin" panose="00000400000000000000" pitchFamily="2" charset="-78"/>
-              </a:rPr>
-              <a:t>فایل ها را نیز به فاز بعدی یعنی فاز استخراج متن می‌فرستیم.</a:t>
+              <a:t>و فایل ها را نیز به فاز بعدی یعنی فاز استخراج متن می‌فرستیم.</a:t>
             </a:r>
           </a:p>
         </p:txBody>
@@ -7269,6 +7401,36 @@
           </a:prstGeom>
         </p:spPr>
       </p:pic>
+      <p:sp>
+        <p:nvSpPr>
+          <p:cNvPr id="7" name="TextBox 6"/>
+          <p:cNvSpPr txBox="1"/>
+          <p:nvPr/>
+        </p:nvSpPr>
+        <p:spPr>
+          <a:xfrm>
+            <a:off x="677334" y="6246891"/>
+            <a:ext cx="793807" cy="369332"/>
+          </a:xfrm>
+          <a:prstGeom prst="rect">
+            <a:avLst/>
+          </a:prstGeom>
+          <a:noFill/>
+        </p:spPr>
+        <p:txBody>
+          <a:bodyPr wrap="none" rtlCol="0">
+            <a:spAutoFit/>
+          </a:bodyPr>
+          <a:lstStyle/>
+          <a:p>
+            <a:r>
+              <a:rPr lang="en-US" dirty="0" smtClean="0"/>
+              <a:t>12/25</a:t>
+            </a:r>
+            <a:endParaRPr lang="en-US" dirty="0"/>
+          </a:p>
+        </p:txBody>
+      </p:sp>
     </p:spTree>
     <p:extLst>
       <p:ext uri="{BB962C8B-B14F-4D97-AF65-F5344CB8AC3E}">
@@ -7433,14 +7595,7 @@
                 <a:latin typeface="Arial" panose="020B0604020202020204" pitchFamily="34" charset="0"/>
                 <a:cs typeface="B Nazanin" panose="00000400000000000000" pitchFamily="2" charset="-78"/>
               </a:rPr>
-              <a:t>برای </a:t>
-            </a:r>
-            <a:r>
-              <a:rPr lang="fa-IR" sz="2200" dirty="0" smtClean="0">
-                <a:latin typeface="Arial" panose="020B0604020202020204" pitchFamily="34" charset="0"/>
-                <a:cs typeface="B Nazanin" panose="00000400000000000000" pitchFamily="2" charset="-78"/>
-              </a:rPr>
-              <a:t>فرمت های </a:t>
+              <a:t>برای فرمت های </a:t>
             </a:r>
             <a:r>
               <a:rPr lang="en-US" sz="2200" dirty="0" smtClean="0">
@@ -7517,14 +7672,7 @@
                 <a:latin typeface="Arial" panose="020B0604020202020204" pitchFamily="34" charset="0"/>
                 <a:cs typeface="B Nazanin" panose="00000400000000000000" pitchFamily="2" charset="-78"/>
               </a:rPr>
-              <a:t>و برای بقیه فرمت </a:t>
-            </a:r>
-            <a:r>
-              <a:rPr lang="fa-IR" sz="2200" dirty="0" smtClean="0">
-                <a:latin typeface="Arial" panose="020B0604020202020204" pitchFamily="34" charset="0"/>
-                <a:cs typeface="B Nazanin" panose="00000400000000000000" pitchFamily="2" charset="-78"/>
-              </a:rPr>
-              <a:t>ها</a:t>
+              <a:t>و برای بقیه فرمت ها</a:t>
             </a:r>
             <a:endParaRPr lang="en-US" sz="2200" dirty="0">
               <a:latin typeface="Arial" panose="020B0604020202020204" pitchFamily="34" charset="0"/>
@@ -7941,6 +8089,36 @@
           </a:prstGeom>
         </p:spPr>
       </p:pic>
+      <p:sp>
+        <p:nvSpPr>
+          <p:cNvPr id="9" name="TextBox 8"/>
+          <p:cNvSpPr txBox="1"/>
+          <p:nvPr/>
+        </p:nvSpPr>
+        <p:spPr>
+          <a:xfrm>
+            <a:off x="341344" y="6271551"/>
+            <a:ext cx="793807" cy="369332"/>
+          </a:xfrm>
+          <a:prstGeom prst="rect">
+            <a:avLst/>
+          </a:prstGeom>
+          <a:noFill/>
+        </p:spPr>
+        <p:txBody>
+          <a:bodyPr wrap="none" rtlCol="0">
+            <a:spAutoFit/>
+          </a:bodyPr>
+          <a:lstStyle/>
+          <a:p>
+            <a:r>
+              <a:rPr lang="en-US" dirty="0" smtClean="0"/>
+              <a:t>14/25</a:t>
+            </a:r>
+            <a:endParaRPr lang="en-US" dirty="0"/>
+          </a:p>
+        </p:txBody>
+      </p:sp>
     </p:spTree>
     <p:extLst>
       <p:ext uri="{BB962C8B-B14F-4D97-AF65-F5344CB8AC3E}">
@@ -8240,6 +8418,36 @@
           </a:prstGeom>
         </p:spPr>
       </p:pic>
+      <p:sp>
+        <p:nvSpPr>
+          <p:cNvPr id="8" name="TextBox 7"/>
+          <p:cNvSpPr txBox="1"/>
+          <p:nvPr/>
+        </p:nvSpPr>
+        <p:spPr>
+          <a:xfrm>
+            <a:off x="677334" y="6246891"/>
+            <a:ext cx="793807" cy="369332"/>
+          </a:xfrm>
+          <a:prstGeom prst="rect">
+            <a:avLst/>
+          </a:prstGeom>
+          <a:noFill/>
+        </p:spPr>
+        <p:txBody>
+          <a:bodyPr wrap="none" rtlCol="0">
+            <a:spAutoFit/>
+          </a:bodyPr>
+          <a:lstStyle/>
+          <a:p>
+            <a:r>
+              <a:rPr lang="en-US" dirty="0" smtClean="0"/>
+              <a:t>15/25</a:t>
+            </a:r>
+            <a:endParaRPr lang="en-US" dirty="0"/>
+          </a:p>
+        </p:txBody>
+      </p:sp>
     </p:spTree>
     <p:extLst>
       <p:ext uri="{BB962C8B-B14F-4D97-AF65-F5344CB8AC3E}">
@@ -8752,6 +8960,36 @@
           </a:fontRef>
         </p:style>
       </p:cxnSp>
+      <p:sp>
+        <p:nvSpPr>
+          <p:cNvPr id="8" name="TextBox 7"/>
+          <p:cNvSpPr txBox="1"/>
+          <p:nvPr/>
+        </p:nvSpPr>
+        <p:spPr>
+          <a:xfrm>
+            <a:off x="677334" y="6246891"/>
+            <a:ext cx="793807" cy="369332"/>
+          </a:xfrm>
+          <a:prstGeom prst="rect">
+            <a:avLst/>
+          </a:prstGeom>
+          <a:noFill/>
+        </p:spPr>
+        <p:txBody>
+          <a:bodyPr wrap="none" rtlCol="0">
+            <a:spAutoFit/>
+          </a:bodyPr>
+          <a:lstStyle/>
+          <a:p>
+            <a:r>
+              <a:rPr lang="en-US" dirty="0" smtClean="0"/>
+              <a:t>16/25</a:t>
+            </a:r>
+            <a:endParaRPr lang="en-US" dirty="0"/>
+          </a:p>
+        </p:txBody>
+      </p:sp>
     </p:spTree>
     <p:extLst>
       <p:ext uri="{BB962C8B-B14F-4D97-AF65-F5344CB8AC3E}">
@@ -8984,27 +9222,7 @@
                 <a:latin typeface="Arial" panose="020B0604020202020204" pitchFamily="34" charset="0"/>
                 <a:cs typeface="B Nazanin" panose="00000400000000000000" pitchFamily="2" charset="-78"/>
               </a:rPr>
-              <a:t> </a:t>
-            </a:r>
-            <a:r>
-              <a:rPr lang="fa-IR" sz="2400" b="1" dirty="0" smtClean="0">
-                <a:solidFill>
-                  <a:schemeClr val="tx1"/>
-                </a:solidFill>
-                <a:latin typeface="Arial" panose="020B0604020202020204" pitchFamily="34" charset="0"/>
-                <a:cs typeface="B Nazanin" panose="00000400000000000000" pitchFamily="2" charset="-78"/>
-              </a:rPr>
-              <a:t>چه نوع جست و جوهایی را پشتیبانی می‌کند </a:t>
-            </a:r>
-            <a:r>
-              <a:rPr lang="fa-IR" sz="2400" b="1" dirty="0" smtClean="0">
-                <a:solidFill>
-                  <a:schemeClr val="tx1"/>
-                </a:solidFill>
-                <a:latin typeface="Arial" panose="020B0604020202020204" pitchFamily="34" charset="0"/>
-                <a:cs typeface="B Nazanin" panose="00000400000000000000" pitchFamily="2" charset="-78"/>
-              </a:rPr>
-              <a:t>؟</a:t>
+              <a:t> چه نوع جست و جوهایی را پشتیبانی می‌کند ؟</a:t>
             </a:r>
           </a:p>
           <a:p>
@@ -9184,6 +9402,36 @@
           </a:extLst>
         </p:spPr>
       </p:pic>
+      <p:sp>
+        <p:nvSpPr>
+          <p:cNvPr id="3" name="TextBox 2"/>
+          <p:cNvSpPr txBox="1"/>
+          <p:nvPr/>
+        </p:nvSpPr>
+        <p:spPr>
+          <a:xfrm>
+            <a:off x="677334" y="6246891"/>
+            <a:ext cx="793807" cy="369332"/>
+          </a:xfrm>
+          <a:prstGeom prst="rect">
+            <a:avLst/>
+          </a:prstGeom>
+          <a:noFill/>
+        </p:spPr>
+        <p:txBody>
+          <a:bodyPr wrap="none" rtlCol="0">
+            <a:spAutoFit/>
+          </a:bodyPr>
+          <a:lstStyle/>
+          <a:p>
+            <a:r>
+              <a:rPr lang="en-US" dirty="0" smtClean="0"/>
+              <a:t>17/25</a:t>
+            </a:r>
+            <a:endParaRPr lang="en-US" dirty="0"/>
+          </a:p>
+        </p:txBody>
+      </p:sp>
     </p:spTree>
     <p:extLst>
       <p:ext uri="{BB962C8B-B14F-4D97-AF65-F5344CB8AC3E}">
@@ -9244,6 +9492,36 @@
           </a:prstGeom>
         </p:spPr>
       </p:pic>
+      <p:sp>
+        <p:nvSpPr>
+          <p:cNvPr id="3" name="TextBox 2"/>
+          <p:cNvSpPr txBox="1"/>
+          <p:nvPr/>
+        </p:nvSpPr>
+        <p:spPr>
+          <a:xfrm>
+            <a:off x="677334" y="6246891"/>
+            <a:ext cx="793807" cy="369332"/>
+          </a:xfrm>
+          <a:prstGeom prst="rect">
+            <a:avLst/>
+          </a:prstGeom>
+          <a:noFill/>
+        </p:spPr>
+        <p:txBody>
+          <a:bodyPr wrap="none" rtlCol="0">
+            <a:spAutoFit/>
+          </a:bodyPr>
+          <a:lstStyle/>
+          <a:p>
+            <a:r>
+              <a:rPr lang="en-US" dirty="0" smtClean="0"/>
+              <a:t>18/25</a:t>
+            </a:r>
+            <a:endParaRPr lang="en-US" dirty="0"/>
+          </a:p>
+        </p:txBody>
+      </p:sp>
     </p:spTree>
     <p:extLst>
       <p:ext uri="{BB962C8B-B14F-4D97-AF65-F5344CB8AC3E}">
@@ -9304,6 +9582,36 @@
           </a:prstGeom>
         </p:spPr>
       </p:pic>
+      <p:sp>
+        <p:nvSpPr>
+          <p:cNvPr id="3" name="TextBox 2"/>
+          <p:cNvSpPr txBox="1"/>
+          <p:nvPr/>
+        </p:nvSpPr>
+        <p:spPr>
+          <a:xfrm>
+            <a:off x="677334" y="6246891"/>
+            <a:ext cx="793807" cy="369332"/>
+          </a:xfrm>
+          <a:prstGeom prst="rect">
+            <a:avLst/>
+          </a:prstGeom>
+          <a:noFill/>
+        </p:spPr>
+        <p:txBody>
+          <a:bodyPr wrap="none" rtlCol="0">
+            <a:spAutoFit/>
+          </a:bodyPr>
+          <a:lstStyle/>
+          <a:p>
+            <a:r>
+              <a:rPr lang="en-US" dirty="0" smtClean="0"/>
+              <a:t>19/25</a:t>
+            </a:r>
+            <a:endParaRPr lang="en-US" dirty="0"/>
+          </a:p>
+        </p:txBody>
+      </p:sp>
     </p:spTree>
     <p:extLst>
       <p:ext uri="{BB962C8B-B14F-4D97-AF65-F5344CB8AC3E}">
@@ -9364,6 +9672,36 @@
           </a:prstGeom>
         </p:spPr>
       </p:pic>
+      <p:sp>
+        <p:nvSpPr>
+          <p:cNvPr id="3" name="TextBox 2"/>
+          <p:cNvSpPr txBox="1"/>
+          <p:nvPr/>
+        </p:nvSpPr>
+        <p:spPr>
+          <a:xfrm>
+            <a:off x="677334" y="6246891"/>
+            <a:ext cx="793807" cy="369332"/>
+          </a:xfrm>
+          <a:prstGeom prst="rect">
+            <a:avLst/>
+          </a:prstGeom>
+          <a:noFill/>
+        </p:spPr>
+        <p:txBody>
+          <a:bodyPr wrap="none" rtlCol="0">
+            <a:spAutoFit/>
+          </a:bodyPr>
+          <a:lstStyle/>
+          <a:p>
+            <a:r>
+              <a:rPr lang="en-US" dirty="0" smtClean="0"/>
+              <a:t>20/25</a:t>
+            </a:r>
+            <a:endParaRPr lang="en-US" dirty="0"/>
+          </a:p>
+        </p:txBody>
+      </p:sp>
     </p:spTree>
     <p:extLst>
       <p:ext uri="{BB962C8B-B14F-4D97-AF65-F5344CB8AC3E}">
@@ -9424,6 +9762,36 @@
           </a:prstGeom>
         </p:spPr>
       </p:pic>
+      <p:sp>
+        <p:nvSpPr>
+          <p:cNvPr id="3" name="TextBox 2"/>
+          <p:cNvSpPr txBox="1"/>
+          <p:nvPr/>
+        </p:nvSpPr>
+        <p:spPr>
+          <a:xfrm>
+            <a:off x="677334" y="6246891"/>
+            <a:ext cx="793807" cy="369332"/>
+          </a:xfrm>
+          <a:prstGeom prst="rect">
+            <a:avLst/>
+          </a:prstGeom>
+          <a:noFill/>
+        </p:spPr>
+        <p:txBody>
+          <a:bodyPr wrap="none" rtlCol="0">
+            <a:spAutoFit/>
+          </a:bodyPr>
+          <a:lstStyle/>
+          <a:p>
+            <a:r>
+              <a:rPr lang="en-US" dirty="0" smtClean="0"/>
+              <a:t>21/25</a:t>
+            </a:r>
+            <a:endParaRPr lang="en-US" dirty="0"/>
+          </a:p>
+        </p:txBody>
+      </p:sp>
     </p:spTree>
     <p:extLst>
       <p:ext uri="{BB962C8B-B14F-4D97-AF65-F5344CB8AC3E}">
@@ -9566,6 +9934,36 @@
           </a:fontRef>
         </p:style>
       </p:cxnSp>
+      <p:sp>
+        <p:nvSpPr>
+          <p:cNvPr id="6" name="TextBox 5"/>
+          <p:cNvSpPr txBox="1"/>
+          <p:nvPr/>
+        </p:nvSpPr>
+        <p:spPr>
+          <a:xfrm>
+            <a:off x="677334" y="6246891"/>
+            <a:ext cx="793807" cy="369332"/>
+          </a:xfrm>
+          <a:prstGeom prst="rect">
+            <a:avLst/>
+          </a:prstGeom>
+          <a:noFill/>
+        </p:spPr>
+        <p:txBody>
+          <a:bodyPr wrap="none" rtlCol="0">
+            <a:spAutoFit/>
+          </a:bodyPr>
+          <a:lstStyle/>
+          <a:p>
+            <a:r>
+              <a:rPr lang="en-US" dirty="0" smtClean="0"/>
+              <a:t>22/25</a:t>
+            </a:r>
+            <a:endParaRPr lang="en-US" dirty="0"/>
+          </a:p>
+        </p:txBody>
+      </p:sp>
     </p:spTree>
     <p:extLst>
       <p:ext uri="{BB962C8B-B14F-4D97-AF65-F5344CB8AC3E}">
@@ -9702,6 +10100,36 @@
           </a:fontRef>
         </p:style>
       </p:cxnSp>
+      <p:sp>
+        <p:nvSpPr>
+          <p:cNvPr id="6" name="TextBox 5"/>
+          <p:cNvSpPr txBox="1"/>
+          <p:nvPr/>
+        </p:nvSpPr>
+        <p:spPr>
+          <a:xfrm>
+            <a:off x="677334" y="6246891"/>
+            <a:ext cx="793807" cy="369332"/>
+          </a:xfrm>
+          <a:prstGeom prst="rect">
+            <a:avLst/>
+          </a:prstGeom>
+          <a:noFill/>
+        </p:spPr>
+        <p:txBody>
+          <a:bodyPr wrap="none" rtlCol="0">
+            <a:spAutoFit/>
+          </a:bodyPr>
+          <a:lstStyle/>
+          <a:p>
+            <a:r>
+              <a:rPr lang="en-US" dirty="0" smtClean="0"/>
+              <a:t>23/25</a:t>
+            </a:r>
+            <a:endParaRPr lang="en-US" dirty="0"/>
+          </a:p>
+        </p:txBody>
+      </p:sp>
     </p:spTree>
     <p:extLst>
       <p:ext uri="{BB962C8B-B14F-4D97-AF65-F5344CB8AC3E}">
@@ -9832,6 +10260,36 @@
           </a:fontRef>
         </p:style>
       </p:cxnSp>
+      <p:sp>
+        <p:nvSpPr>
+          <p:cNvPr id="6" name="TextBox 5"/>
+          <p:cNvSpPr txBox="1"/>
+          <p:nvPr/>
+        </p:nvSpPr>
+        <p:spPr>
+          <a:xfrm>
+            <a:off x="677334" y="6246891"/>
+            <a:ext cx="793807" cy="369332"/>
+          </a:xfrm>
+          <a:prstGeom prst="rect">
+            <a:avLst/>
+          </a:prstGeom>
+          <a:noFill/>
+        </p:spPr>
+        <p:txBody>
+          <a:bodyPr wrap="none" rtlCol="0">
+            <a:spAutoFit/>
+          </a:bodyPr>
+          <a:lstStyle/>
+          <a:p>
+            <a:r>
+              <a:rPr lang="en-US" dirty="0" smtClean="0"/>
+              <a:t>24/25</a:t>
+            </a:r>
+            <a:endParaRPr lang="en-US" dirty="0"/>
+          </a:p>
+        </p:txBody>
+      </p:sp>
     </p:spTree>
     <p:extLst>
       <p:ext uri="{BB962C8B-B14F-4D97-AF65-F5344CB8AC3E}">
@@ -10346,6 +10804,36 @@
           </a:fontRef>
         </p:style>
       </p:cxnSp>
+      <p:sp>
+        <p:nvSpPr>
+          <p:cNvPr id="6" name="TextBox 5"/>
+          <p:cNvSpPr txBox="1"/>
+          <p:nvPr/>
+        </p:nvSpPr>
+        <p:spPr>
+          <a:xfrm>
+            <a:off x="677334" y="6246891"/>
+            <a:ext cx="671979" cy="369332"/>
+          </a:xfrm>
+          <a:prstGeom prst="rect">
+            <a:avLst/>
+          </a:prstGeom>
+          <a:noFill/>
+        </p:spPr>
+        <p:txBody>
+          <a:bodyPr wrap="none" rtlCol="0">
+            <a:spAutoFit/>
+          </a:bodyPr>
+          <a:lstStyle/>
+          <a:p>
+            <a:r>
+              <a:rPr lang="en-US" dirty="0" smtClean="0"/>
+              <a:t>1/25</a:t>
+            </a:r>
+            <a:endParaRPr lang="en-US" dirty="0"/>
+          </a:p>
+        </p:txBody>
+      </p:sp>
     </p:spTree>
     <p:extLst>
       <p:ext uri="{BB962C8B-B14F-4D97-AF65-F5344CB8AC3E}">
@@ -10521,17 +11009,8 @@
               <a:rPr lang="fa-IR" sz="2800" dirty="0" smtClean="0">
                 <a:cs typeface="B Nazanin" panose="00000400000000000000" pitchFamily="2" charset="-78"/>
               </a:rPr>
-              <a:t>جو طراحی شده است</a:t>
-            </a:r>
-            <a:r>
-              <a:rPr lang="fa-IR" sz="2800" dirty="0" smtClean="0">
-                <a:cs typeface="B Nazanin" panose="00000400000000000000" pitchFamily="2" charset="-78"/>
-              </a:rPr>
-              <a:t>.</a:t>
-            </a:r>
-            <a:endParaRPr lang="fa-IR" sz="2800" dirty="0" smtClean="0">
-              <a:cs typeface="B Nazanin" panose="00000400000000000000" pitchFamily="2" charset="-78"/>
-            </a:endParaRPr>
+              <a:t>جو طراحی شده است.</a:t>
+            </a:r>
           </a:p>
         </p:txBody>
       </p:sp>
@@ -10566,6 +11045,36 @@
           </a:fontRef>
         </p:style>
       </p:cxnSp>
+      <p:sp>
+        <p:nvSpPr>
+          <p:cNvPr id="6" name="TextBox 5"/>
+          <p:cNvSpPr txBox="1"/>
+          <p:nvPr/>
+        </p:nvSpPr>
+        <p:spPr>
+          <a:xfrm>
+            <a:off x="677334" y="6246891"/>
+            <a:ext cx="671979" cy="369332"/>
+          </a:xfrm>
+          <a:prstGeom prst="rect">
+            <a:avLst/>
+          </a:prstGeom>
+          <a:noFill/>
+        </p:spPr>
+        <p:txBody>
+          <a:bodyPr wrap="none" rtlCol="0">
+            <a:spAutoFit/>
+          </a:bodyPr>
+          <a:lstStyle/>
+          <a:p>
+            <a:r>
+              <a:rPr lang="en-US" dirty="0" smtClean="0"/>
+              <a:t>2/25</a:t>
+            </a:r>
+            <a:endParaRPr lang="en-US" dirty="0"/>
+          </a:p>
+        </p:txBody>
+      </p:sp>
     </p:spTree>
     <p:extLst>
       <p:ext uri="{BB962C8B-B14F-4D97-AF65-F5344CB8AC3E}">
@@ -10728,17 +11237,8 @@
               <a:rPr lang="fa-IR" sz="2800" dirty="0" smtClean="0">
                 <a:cs typeface="B Nazanin" panose="00000400000000000000" pitchFamily="2" charset="-78"/>
               </a:rPr>
-              <a:t>اپل و ای بی </a:t>
-            </a:r>
-            <a:r>
-              <a:rPr lang="fa-IR" sz="2800" dirty="0" smtClean="0">
-                <a:cs typeface="B Nazanin" panose="00000400000000000000" pitchFamily="2" charset="-78"/>
-              </a:rPr>
-              <a:t>ام.</a:t>
-            </a:r>
-            <a:endParaRPr lang="fa-IR" sz="2800" dirty="0" smtClean="0">
-              <a:cs typeface="B Nazanin" panose="00000400000000000000" pitchFamily="2" charset="-78"/>
-            </a:endParaRPr>
+              <a:t>اپل و ای بی ام.</a:t>
+            </a:r>
           </a:p>
         </p:txBody>
       </p:sp>
@@ -10773,6 +11273,36 @@
           </a:fontRef>
         </p:style>
       </p:cxnSp>
+      <p:sp>
+        <p:nvSpPr>
+          <p:cNvPr id="6" name="TextBox 5"/>
+          <p:cNvSpPr txBox="1"/>
+          <p:nvPr/>
+        </p:nvSpPr>
+        <p:spPr>
+          <a:xfrm>
+            <a:off x="677334" y="6246891"/>
+            <a:ext cx="671979" cy="369332"/>
+          </a:xfrm>
+          <a:prstGeom prst="rect">
+            <a:avLst/>
+          </a:prstGeom>
+          <a:noFill/>
+        </p:spPr>
+        <p:txBody>
+          <a:bodyPr wrap="none" rtlCol="0">
+            <a:spAutoFit/>
+          </a:bodyPr>
+          <a:lstStyle/>
+          <a:p>
+            <a:r>
+              <a:rPr lang="en-US" dirty="0" smtClean="0"/>
+              <a:t>3/25</a:t>
+            </a:r>
+            <a:endParaRPr lang="en-US" dirty="0"/>
+          </a:p>
+        </p:txBody>
+      </p:sp>
     </p:spTree>
     <p:extLst>
       <p:ext uri="{BB962C8B-B14F-4D97-AF65-F5344CB8AC3E}">
@@ -11086,6 +11616,36 @@
           </a:fontRef>
         </p:style>
       </p:cxnSp>
+      <p:sp>
+        <p:nvSpPr>
+          <p:cNvPr id="6" name="TextBox 5"/>
+          <p:cNvSpPr txBox="1"/>
+          <p:nvPr/>
+        </p:nvSpPr>
+        <p:spPr>
+          <a:xfrm>
+            <a:off x="677334" y="6246891"/>
+            <a:ext cx="671979" cy="369332"/>
+          </a:xfrm>
+          <a:prstGeom prst="rect">
+            <a:avLst/>
+          </a:prstGeom>
+          <a:noFill/>
+        </p:spPr>
+        <p:txBody>
+          <a:bodyPr wrap="none" rtlCol="0">
+            <a:spAutoFit/>
+          </a:bodyPr>
+          <a:lstStyle/>
+          <a:p>
+            <a:r>
+              <a:rPr lang="en-US" dirty="0" smtClean="0"/>
+              <a:t>4/25</a:t>
+            </a:r>
+            <a:endParaRPr lang="en-US" dirty="0"/>
+          </a:p>
+        </p:txBody>
+      </p:sp>
     </p:spTree>
     <p:extLst>
       <p:ext uri="{BB962C8B-B14F-4D97-AF65-F5344CB8AC3E}">
@@ -11158,14 +11718,7 @@
                 <a:latin typeface="Arial" panose="020B0604020202020204" pitchFamily="34" charset="0"/>
                 <a:cs typeface="B Nazanin" panose="00000400000000000000" pitchFamily="2" charset="-78"/>
               </a:rPr>
-              <a:t> </a:t>
-            </a:r>
-            <a:r>
-              <a:rPr lang="fa-IR" dirty="0" smtClean="0">
-                <a:latin typeface="Arial" panose="020B0604020202020204" pitchFamily="34" charset="0"/>
-                <a:cs typeface="B Nazanin" panose="00000400000000000000" pitchFamily="2" charset="-78"/>
-              </a:rPr>
-              <a:t>چگونه ایندکس می‌کند؟</a:t>
+              <a:t> چگونه ایندکس می‌کند؟</a:t>
             </a:r>
             <a:endParaRPr lang="en-US" dirty="0">
               <a:latin typeface="Arial" panose="020B0604020202020204" pitchFamily="34" charset="0"/>
@@ -12722,6 +13275,36 @@
           </a:fontRef>
         </p:style>
       </p:cxnSp>
+      <p:sp>
+        <p:nvSpPr>
+          <p:cNvPr id="8" name="TextBox 7"/>
+          <p:cNvSpPr txBox="1"/>
+          <p:nvPr/>
+        </p:nvSpPr>
+        <p:spPr>
+          <a:xfrm>
+            <a:off x="677334" y="6246891"/>
+            <a:ext cx="671979" cy="369332"/>
+          </a:xfrm>
+          <a:prstGeom prst="rect">
+            <a:avLst/>
+          </a:prstGeom>
+          <a:noFill/>
+        </p:spPr>
+        <p:txBody>
+          <a:bodyPr wrap="none" rtlCol="0">
+            <a:spAutoFit/>
+          </a:bodyPr>
+          <a:lstStyle/>
+          <a:p>
+            <a:r>
+              <a:rPr lang="en-US" dirty="0" smtClean="0"/>
+              <a:t>5/25</a:t>
+            </a:r>
+            <a:endParaRPr lang="en-US" dirty="0"/>
+          </a:p>
+        </p:txBody>
+      </p:sp>
     </p:spTree>
     <p:extLst>
       <p:ext uri="{BB962C8B-B14F-4D97-AF65-F5344CB8AC3E}">
@@ -13236,6 +13819,36 @@
           </a:fontRef>
         </p:style>
       </p:cxnSp>
+      <p:sp>
+        <p:nvSpPr>
+          <p:cNvPr id="6" name="TextBox 5"/>
+          <p:cNvSpPr txBox="1"/>
+          <p:nvPr/>
+        </p:nvSpPr>
+        <p:spPr>
+          <a:xfrm>
+            <a:off x="677334" y="6246891"/>
+            <a:ext cx="671979" cy="369332"/>
+          </a:xfrm>
+          <a:prstGeom prst="rect">
+            <a:avLst/>
+          </a:prstGeom>
+          <a:noFill/>
+        </p:spPr>
+        <p:txBody>
+          <a:bodyPr wrap="none" rtlCol="0">
+            <a:spAutoFit/>
+          </a:bodyPr>
+          <a:lstStyle/>
+          <a:p>
+            <a:r>
+              <a:rPr lang="en-US" dirty="0" smtClean="0"/>
+              <a:t>6/25</a:t>
+            </a:r>
+            <a:endParaRPr lang="en-US" dirty="0"/>
+          </a:p>
+        </p:txBody>
+      </p:sp>
     </p:spTree>
     <p:extLst>
       <p:ext uri="{BB962C8B-B14F-4D97-AF65-F5344CB8AC3E}">

</xml_diff>